<commit_message>
Updated Powerpoints & .md files
updating the setting up the enviornments
</commit_message>
<xml_diff>
--- a/01.Introduction to the Day/Introduction to the Day.pptx
+++ b/01.Introduction to the Day/Introduction to the Day.pptx
@@ -402,7 +402,7 @@
           <a:p>
             <a:fld id="{DE219B1A-AE41-483B-A766-69B9363DDA6A}" type="datetimeFigureOut">
               <a:rPr lang="en-US" smtClean="0"/>
-              <a:t>10/27/2014</a:t>
+              <a:t>5/31/2015</a:t>
             </a:fld>
             <a:endParaRPr lang="en-US"/>
           </a:p>
@@ -684,7 +684,7 @@
           <a:p>
             <a:fld id="{D51B1278-D92B-4AF3-A9C1-71DD298190CE}" type="datetimeFigureOut">
               <a:rPr lang="en-US" smtClean="0"/>
-              <a:t>10/27/2014</a:t>
+              <a:t>5/31/2015</a:t>
             </a:fld>
             <a:endParaRPr lang="en-US"/>
           </a:p>
@@ -1398,7 +1398,7 @@
                 </a:solidFill>
               </a:rPr>
               <a:pPr/>
-              <a:t>10/27/2014</a:t>
+              <a:t>5/31/2015</a:t>
             </a:fld>
             <a:endParaRPr lang="en-US">
               <a:solidFill>
@@ -1630,7 +1630,7 @@
           <a:p>
             <a:fld id="{D31E4894-7650-4412-ACB8-29465F440D88}" type="datetime1">
               <a:rPr lang="en-US" smtClean="0"/>
-              <a:t>10/27/2014</a:t>
+              <a:t>5/31/2015</a:t>
             </a:fld>
             <a:endParaRPr lang="en-US" dirty="0"/>
           </a:p>
@@ -1866,7 +1866,7 @@
                 </a:solidFill>
               </a:rPr>
               <a:pPr/>
-              <a:t>10/27/2014</a:t>
+              <a:t>5/31/2015</a:t>
             </a:fld>
             <a:endParaRPr lang="en-US">
               <a:solidFill>
@@ -2098,7 +2098,7 @@
           <a:p>
             <a:fld id="{13E92F52-F2C6-4745-BBDE-E5EE0DA70D4E}" type="datetime1">
               <a:rPr lang="en-US" smtClean="0"/>
-              <a:t>10/27/2014</a:t>
+              <a:t>5/31/2015</a:t>
             </a:fld>
             <a:endParaRPr lang="en-US" dirty="0"/>
           </a:p>
@@ -2240,7 +2240,7 @@
           <a:p>
             <a:fld id="{D51B1278-D92B-4AF3-A9C1-71DD298190CE}" type="datetimeFigureOut">
               <a:rPr lang="en-US" smtClean="0"/>
-              <a:t>10/27/2014</a:t>
+              <a:t>5/31/2015</a:t>
             </a:fld>
             <a:endParaRPr lang="en-US"/>
           </a:p>
@@ -2462,7 +2462,7 @@
           <a:p>
             <a:fld id="{D51B1278-D92B-4AF3-A9C1-71DD298190CE}" type="datetimeFigureOut">
               <a:rPr lang="en-US" smtClean="0"/>
-              <a:t>10/27/2014</a:t>
+              <a:t>5/31/2015</a:t>
             </a:fld>
             <a:endParaRPr lang="en-US"/>
           </a:p>
@@ -2699,7 +2699,7 @@
           <a:p>
             <a:fld id="{DBC13BCB-57C4-454F-8C02-26BDCE1A7007}" type="datetime1">
               <a:rPr lang="en-US" smtClean="0"/>
-              <a:t>10/27/2014</a:t>
+              <a:t>5/31/2015</a:t>
             </a:fld>
             <a:endParaRPr lang="en-US"/>
           </a:p>
@@ -2939,7 +2939,7 @@
           <a:p>
             <a:fld id="{4158D9CF-52ED-4C2B-9870-3BEFB23E0EBC}" type="datetime1">
               <a:rPr lang="en-US" smtClean="0"/>
-              <a:t>10/27/2014</a:t>
+              <a:t>5/31/2015</a:t>
             </a:fld>
             <a:endParaRPr lang="en-US" dirty="0"/>
           </a:p>
@@ -3109,7 +3109,7 @@
           <a:p>
             <a:fld id="{D51B1278-D92B-4AF3-A9C1-71DD298190CE}" type="datetimeFigureOut">
               <a:rPr lang="en-US" smtClean="0"/>
-              <a:t>10/27/2014</a:t>
+              <a:t>5/31/2015</a:t>
             </a:fld>
             <a:endParaRPr lang="en-US"/>
           </a:p>
@@ -3311,37 +3311,6 @@
               <a:tabLst/>
               <a:defRPr/>
             </a:pPr>
-            <a:r>
-              <a:rPr lang="en-US" baseline="0" dirty="0" smtClean="0"/>
-              <a:t>See the demo script /demos/script-module03.md for instructions</a:t>
-            </a:r>
-            <a:endParaRPr lang="en-US" dirty="0" smtClean="0"/>
-          </a:p>
-          <a:p>
-            <a:endParaRPr lang="en-US" dirty="0" smtClean="0"/>
-          </a:p>
-          <a:p>
-            <a:r>
-              <a:rPr lang="en-US" dirty="0" smtClean="0"/>
-              <a:t>These</a:t>
-            </a:r>
-            <a:r>
-              <a:rPr lang="en-US" baseline="0" dirty="0" smtClean="0"/>
-              <a:t> demos show how to do simply OAuth2 programming &amp; dealing with app permissions and identity as well as working with the cross domain library.</a:t>
-            </a:r>
-          </a:p>
-          <a:p>
-            <a:endParaRPr lang="en-US" baseline="0" dirty="0" smtClean="0"/>
-          </a:p>
-          <a:p>
-            <a:r>
-              <a:rPr lang="en-US" dirty="0" smtClean="0"/>
-              <a:t>Focus on USING the deployed</a:t>
-            </a:r>
-            <a:r>
-              <a:rPr lang="en-US" baseline="0" dirty="0" smtClean="0"/>
-              <a:t> solution, not building it.</a:t>
-            </a:r>
             <a:endParaRPr lang="en-US" dirty="0"/>
           </a:p>
         </p:txBody>
@@ -3363,7 +3332,7 @@
           <a:p>
             <a:fld id="{D51B1278-D92B-4AF3-A9C1-71DD298190CE}" type="datetimeFigureOut">
               <a:rPr lang="en-US" smtClean="0"/>
-              <a:t>10/27/2014</a:t>
+              <a:t>5/31/2015</a:t>
             </a:fld>
             <a:endParaRPr lang="en-US"/>
           </a:p>
@@ -3628,7 +3597,7 @@
           <a:p>
             <a:fld id="{B079C3B8-7366-4A44-A34B-3977080C19E7}" type="datetime1">
               <a:rPr lang="en-US" smtClean="0"/>
-              <a:t>10/27/2014</a:t>
+              <a:t>5/31/2015</a:t>
             </a:fld>
             <a:endParaRPr lang="en-US" dirty="0"/>
           </a:p>
@@ -3738,23 +3707,6 @@
           <a:bodyPr/>
           <a:lstStyle/>
           <a:p>
-            <a:r>
-              <a:rPr lang="en-US" dirty="0" smtClean="0"/>
-              <a:t>This demo shows the final solution built in module 4. </a:t>
-            </a:r>
-          </a:p>
-          <a:p>
-            <a:endParaRPr lang="en-US" dirty="0" smtClean="0"/>
-          </a:p>
-          <a:p>
-            <a:r>
-              <a:rPr lang="en-US" dirty="0" smtClean="0"/>
-              <a:t>Focus on USING the deployed</a:t>
-            </a:r>
-            <a:r>
-              <a:rPr lang="en-US" baseline="0" dirty="0" smtClean="0"/>
-              <a:t> solution, not building it.</a:t>
-            </a:r>
             <a:endParaRPr lang="en-US" dirty="0"/>
           </a:p>
         </p:txBody>
@@ -3776,7 +3728,7 @@
           <a:p>
             <a:fld id="{D51B1278-D92B-4AF3-A9C1-71DD298190CE}" type="datetimeFigureOut">
               <a:rPr lang="en-US" smtClean="0"/>
-              <a:t>10/27/2014</a:t>
+              <a:t>5/31/2015</a:t>
             </a:fld>
             <a:endParaRPr lang="en-US"/>
           </a:p>
@@ -3978,33 +3930,6 @@
               <a:tabLst/>
               <a:defRPr/>
             </a:pPr>
-            <a:r>
-              <a:rPr lang="en-US" baseline="0" dirty="0" smtClean="0"/>
-              <a:t>See the demo script /demos/script-module05.md for instructions</a:t>
-            </a:r>
-            <a:endParaRPr lang="en-US" dirty="0" smtClean="0"/>
-          </a:p>
-          <a:p>
-            <a:endParaRPr lang="en-US" dirty="0" smtClean="0"/>
-          </a:p>
-          <a:p>
-            <a:r>
-              <a:rPr lang="en-US" dirty="0" smtClean="0"/>
-              <a:t>This demo shows the final solution built in module 5. </a:t>
-            </a:r>
-          </a:p>
-          <a:p>
-            <a:endParaRPr lang="en-US" dirty="0" smtClean="0"/>
-          </a:p>
-          <a:p>
-            <a:r>
-              <a:rPr lang="en-US" dirty="0" smtClean="0"/>
-              <a:t>Focus on USING the deployed</a:t>
-            </a:r>
-            <a:r>
-              <a:rPr lang="en-US" baseline="0" dirty="0" smtClean="0"/>
-              <a:t> solution, not building it.</a:t>
-            </a:r>
             <a:endParaRPr lang="en-US" dirty="0"/>
           </a:p>
         </p:txBody>
@@ -4026,7 +3951,7 @@
           <a:p>
             <a:fld id="{D51B1278-D92B-4AF3-A9C1-71DD298190CE}" type="datetimeFigureOut">
               <a:rPr lang="en-US" smtClean="0"/>
-              <a:t>10/27/2014</a:t>
+              <a:t>5/31/2015</a:t>
             </a:fld>
             <a:endParaRPr lang="en-US"/>
           </a:p>
@@ -4291,7 +4216,7 @@
           <a:p>
             <a:fld id="{B079C3B8-7366-4A44-A34B-3977080C19E7}" type="datetime1">
               <a:rPr lang="en-US" smtClean="0"/>
-              <a:t>10/27/2014</a:t>
+              <a:t>5/31/2015</a:t>
             </a:fld>
             <a:endParaRPr lang="en-US" dirty="0"/>
           </a:p>
@@ -4538,7 +4463,7 @@
           <a:p>
             <a:fld id="{0BB6559B-C68D-49B4-97AE-9BB74C417927}" type="datetime1">
               <a:rPr lang="en-US" smtClean="0"/>
-              <a:t>10/27/2014</a:t>
+              <a:t>5/31/2015</a:t>
             </a:fld>
             <a:endParaRPr lang="en-US"/>
           </a:p>
@@ -4772,7 +4697,7 @@
           <a:p>
             <a:fld id="{3DE98D88-4B2E-4AAB-9ECA-CFD46E198059}" type="datetime1">
               <a:rPr lang="en-US" smtClean="0"/>
-              <a:t>10/27/2014</a:t>
+              <a:t>5/31/2015</a:t>
             </a:fld>
             <a:endParaRPr lang="en-US" dirty="0"/>
           </a:p>
@@ -5098,7 +5023,7 @@
           <a:p>
             <a:fld id="{D51B1278-D92B-4AF3-A9C1-71DD298190CE}" type="datetimeFigureOut">
               <a:rPr lang="en-US" smtClean="0"/>
-              <a:t>10/27/2014</a:t>
+              <a:t>5/31/2015</a:t>
             </a:fld>
             <a:endParaRPr lang="en-US"/>
           </a:p>
@@ -5736,7 +5661,7 @@
                 </a:solidFill>
               </a:rPr>
               <a:pPr/>
-              <a:t>10/27/2014</a:t>
+              <a:t>5/31/2015</a:t>
             </a:fld>
             <a:endParaRPr lang="en-US">
               <a:solidFill>
@@ -5977,7 +5902,7 @@
           <a:p>
             <a:fld id="{3B7A2A12-E0E2-4D2C-A6ED-C38FD9033759}" type="datetime1">
               <a:rPr lang="en-US" smtClean="0"/>
-              <a:t>10/27/2014</a:t>
+              <a:t>5/31/2015</a:t>
             </a:fld>
             <a:endParaRPr lang="en-US" dirty="0"/>
           </a:p>
@@ -16194,7 +16119,7 @@
           <a:p>
             <a:r>
               <a:rPr lang="en-US" dirty="0" smtClean="0"/>
-              <a:t>September 2014</a:t>
+              <a:t>Detroit, June 2016</a:t>
             </a:r>
             <a:endParaRPr lang="en-US" dirty="0"/>
           </a:p>
@@ -17817,7 +17742,7 @@
           </a:effectLst>
           <a:extLst>
             <a:ext uri="{909E8E84-426E-40dd-AFC4-6F175D3DCCD1}">
-              <a14:hiddenFill xmlns="" xmlns:a14="http://schemas.microsoft.com/office/drawing/2010/main">
+              <a14:hiddenFill xmlns:a14="http://schemas.microsoft.com/office/drawing/2010/main" xmlns="">
                 <a:solidFill>
                   <a:srgbClr val="FFFFFF"/>
                 </a:solidFill>
@@ -17920,7 +17845,7 @@
           <a:noFill/>
           <a:extLst>
             <a:ext uri="{909E8E84-426E-40dd-AFC4-6F175D3DCCD1}">
-              <a14:hiddenFill xmlns="" xmlns:a14="http://schemas.microsoft.com/office/drawing/2010/main">
+              <a14:hiddenFill xmlns:a14="http://schemas.microsoft.com/office/drawing/2010/main" xmlns="">
                 <a:solidFill>
                   <a:srgbClr val="FFFFFF"/>
                 </a:solidFill>
@@ -22088,7 +22013,7 @@
           </a:effectLst>
           <a:extLst>
             <a:ext uri="{909E8E84-426E-40dd-AFC4-6F175D3DCCD1}">
-              <a14:hiddenFill xmlns="" xmlns:a14="http://schemas.microsoft.com/office/drawing/2010/main">
+              <a14:hiddenFill xmlns:a14="http://schemas.microsoft.com/office/drawing/2010/main" xmlns="">
                 <a:solidFill>
                   <a:schemeClr val="accent1"/>
                 </a:solidFill>
@@ -24319,7 +24244,7 @@
             <p:ph sz="quarter" idx="10"/>
             <p:extLst>
               <p:ext uri="{D42A27DB-BD31-4B8C-83A1-F6EECF244321}">
-                <p14:modId xmlns:p14="http://schemas.microsoft.com/office/powerpoint/2010/main" val="61927298"/>
+                <p14:modId xmlns:p14="http://schemas.microsoft.com/office/powerpoint/2010/main" val="3275888687"/>
               </p:ext>
             </p:extLst>
           </p:nvPr>
@@ -24338,7 +24263,7 @@
                 <a:gridCol w="11225057">
                   <a:extLst>
                     <a:ext uri="{9D8B030D-6E8A-4147-A177-3AD203B41FA5}">
-                      <a16:colId xmlns="" xmlns:a16="http://schemas.microsoft.com/office/drawing/2014/main" val="1253488153"/>
+                      <a16:colId xmlns:a16="http://schemas.microsoft.com/office/drawing/2014/main" xmlns="" val="1253488153"/>
                     </a:ext>
                   </a:extLst>
                 </a:gridCol>
@@ -24360,7 +24285,7 @@
                 </a:tc>
                 <a:extLst>
                   <a:ext uri="{0D108BD9-81ED-4DB2-BD59-A6C34878D82A}">
-                    <a16:rowId xmlns="" xmlns:a16="http://schemas.microsoft.com/office/drawing/2014/main" val="829859176"/>
+                    <a16:rowId xmlns:a16="http://schemas.microsoft.com/office/drawing/2014/main" xmlns="" val="829859176"/>
                   </a:ext>
                 </a:extLst>
               </a:tr>
@@ -24380,7 +24305,7 @@
                 </a:tc>
                 <a:extLst>
                   <a:ext uri="{0D108BD9-81ED-4DB2-BD59-A6C34878D82A}">
-                    <a16:rowId xmlns="" xmlns:a16="http://schemas.microsoft.com/office/drawing/2014/main" val="1946132611"/>
+                    <a16:rowId xmlns:a16="http://schemas.microsoft.com/office/drawing/2014/main" xmlns="" val="1946132611"/>
                   </a:ext>
                 </a:extLst>
               </a:tr>
@@ -24409,15 +24334,20 @@
                       </a:pPr>
                       <a:r>
                         <a:rPr lang="en-US" sz="2400" dirty="0" smtClean="0"/>
-                        <a:t>Module 2: Setting up the Environments</a:t>
+                        <a:t>Module 2: Setting up the </a:t>
                       </a:r>
+                      <a:r>
+                        <a:rPr lang="en-US" sz="2400" dirty="0" smtClean="0"/>
+                        <a:t>Environment</a:t>
+                      </a:r>
+                      <a:endParaRPr lang="en-US" sz="2400" dirty="0" smtClean="0"/>
                     </a:p>
                   </a:txBody>
                   <a:tcPr marL="91403" marR="91403" marT="45701" marB="45701" anchor="ctr"/>
                 </a:tc>
                 <a:extLst>
                   <a:ext uri="{0D108BD9-81ED-4DB2-BD59-A6C34878D82A}">
-                    <a16:rowId xmlns="" xmlns:a16="http://schemas.microsoft.com/office/drawing/2014/main" val="3204002662"/>
+                    <a16:rowId xmlns:a16="http://schemas.microsoft.com/office/drawing/2014/main" xmlns="" val="3204002662"/>
                   </a:ext>
                 </a:extLst>
               </a:tr>
@@ -24446,15 +24376,24 @@
                       </a:pPr>
                       <a:r>
                         <a:rPr lang="en-US" sz="2400" dirty="0" smtClean="0"/>
-                        <a:t>Module 3: Hook into Apps for SharePoint</a:t>
+                        <a:t>Module 3: </a:t>
                       </a:r>
+                      <a:r>
+                        <a:rPr lang="en-US" sz="2400" dirty="0" smtClean="0"/>
+                        <a:t>Add</a:t>
+                      </a:r>
+                      <a:r>
+                        <a:rPr lang="en-US" sz="2400" baseline="0" dirty="0" smtClean="0"/>
+                        <a:t>-ins for Office</a:t>
+                      </a:r>
+                      <a:endParaRPr lang="en-US" sz="2400" dirty="0" smtClean="0"/>
                     </a:p>
                   </a:txBody>
                   <a:tcPr marL="91403" marR="91403" marT="45701" marB="45701" anchor="ctr"/>
                 </a:tc>
                 <a:extLst>
                   <a:ext uri="{0D108BD9-81ED-4DB2-BD59-A6C34878D82A}">
-                    <a16:rowId xmlns="" xmlns:a16="http://schemas.microsoft.com/office/drawing/2014/main" val="4266278162"/>
+                    <a16:rowId xmlns:a16="http://schemas.microsoft.com/office/drawing/2014/main" xmlns="" val="4266278162"/>
                   </a:ext>
                 </a:extLst>
               </a:tr>
@@ -24487,7 +24426,11 @@
                       </a:r>
                       <a:r>
                         <a:rPr lang="en-US" sz="2400" dirty="0" smtClean="0"/>
-                        <a:t>Hook into Office 365 APIs</a:t>
+                        <a:t>Building apps with the Office </a:t>
+                      </a:r>
+                      <a:r>
+                        <a:rPr lang="en-US" sz="2400" dirty="0" smtClean="0"/>
+                        <a:t>365 APIs</a:t>
                       </a:r>
                     </a:p>
                   </a:txBody>
@@ -24519,8 +24462,17 @@
                       </a:pPr>
                       <a:r>
                         <a:rPr lang="en-US" sz="2400" b="0" dirty="0" smtClean="0"/>
-                        <a:t>Module 5: Hook into Apps for Office</a:t>
+                        <a:t>Module 5: </a:t>
                       </a:r>
+                      <a:r>
+                        <a:rPr lang="en-US" sz="2400" b="0" dirty="0" smtClean="0"/>
+                        <a:t>Building</a:t>
+                      </a:r>
+                      <a:r>
+                        <a:rPr lang="en-US" sz="2400" b="0" baseline="0" dirty="0" smtClean="0"/>
+                        <a:t> SharePoint add-ins using Search</a:t>
+                      </a:r>
+                      <a:endParaRPr lang="en-US" sz="2400" b="0" dirty="0" smtClean="0"/>
                     </a:p>
                   </a:txBody>
                   <a:tcPr marL="91403" marR="91403" marT="45701" marB="45701" anchor="ctr"/>
@@ -28216,7 +28168,7 @@
               </a:ln>
               <a:extLst>
                 <a:ext uri="{91240B29-F687-4f45-9708-019B960494DF}">
-                  <a14:hiddenLine xmlns="" xmlns:a14="http://schemas.microsoft.com/office/drawing/2010/main" w="9525">
+                  <a14:hiddenLine xmlns:a14="http://schemas.microsoft.com/office/drawing/2010/main" xmlns="" w="9525">
                     <a:solidFill>
                       <a:srgbClr val="000000"/>
                     </a:solidFill>
@@ -28317,7 +28269,7 @@
               </a:ln>
               <a:extLst>
                 <a:ext uri="{91240B29-F687-4f45-9708-019B960494DF}">
-                  <a14:hiddenLine xmlns="" xmlns:a14="http://schemas.microsoft.com/office/drawing/2010/main" w="9525">
+                  <a14:hiddenLine xmlns:a14="http://schemas.microsoft.com/office/drawing/2010/main" xmlns="" w="9525">
                     <a:solidFill>
                       <a:srgbClr val="000000"/>
                     </a:solidFill>
@@ -35117,7 +35069,7 @@
               </a:ln>
               <a:extLst>
                 <a:ext uri="{91240B29-F687-4f45-9708-019B960494DF}">
-                  <a14:hiddenLine xmlns="" xmlns:a14="http://schemas.microsoft.com/office/drawing/2010/main" w="9525">
+                  <a14:hiddenLine xmlns:a14="http://schemas.microsoft.com/office/drawing/2010/main" xmlns="" w="9525">
                     <a:solidFill>
                       <a:srgbClr val="000000"/>
                     </a:solidFill>
@@ -35275,7 +35227,7 @@
               </a:ln>
               <a:extLst>
                 <a:ext uri="{91240B29-F687-4f45-9708-019B960494DF}">
-                  <a14:hiddenLine xmlns="" xmlns:a14="http://schemas.microsoft.com/office/drawing/2010/main" w="9525">
+                  <a14:hiddenLine xmlns:a14="http://schemas.microsoft.com/office/drawing/2010/main" xmlns="" w="9525">
                     <a:solidFill>
                       <a:srgbClr val="000000"/>
                     </a:solidFill>
@@ -35335,7 +35287,7 @@
               </a:ln>
               <a:extLst>
                 <a:ext uri="{91240B29-F687-4f45-9708-019B960494DF}">
-                  <a14:hiddenLine xmlns="" xmlns:a14="http://schemas.microsoft.com/office/drawing/2010/main" w="9525">
+                  <a14:hiddenLine xmlns:a14="http://schemas.microsoft.com/office/drawing/2010/main" xmlns="" w="9525">
                     <a:solidFill>
                       <a:srgbClr val="000000"/>
                     </a:solidFill>
@@ -35512,7 +35464,7 @@
               </a:ln>
               <a:extLst>
                 <a:ext uri="{91240B29-F687-4f45-9708-019B960494DF}">
-                  <a14:hiddenLine xmlns="" xmlns:a14="http://schemas.microsoft.com/office/drawing/2010/main" w="9525">
+                  <a14:hiddenLine xmlns:a14="http://schemas.microsoft.com/office/drawing/2010/main" xmlns="" w="9525">
                     <a:solidFill>
                       <a:srgbClr val="000000"/>
                     </a:solidFill>
@@ -36957,11 +36909,11 @@
           <a:p>
             <a:r>
               <a:rPr lang="en-US" sz="3100" b="0" dirty="0" smtClean="0"/>
-              <a:t>Module 3 – Hook into Apps for </a:t>
+              <a:t>Module 3 – </a:t>
             </a:r>
             <a:r>
-              <a:rPr lang="en-US" sz="3100" b="0" dirty="0" err="1" smtClean="0"/>
-              <a:t>SHarePoint</a:t>
+              <a:rPr lang="en-US" sz="3100" b="0" dirty="0" smtClean="0"/>
+              <a:t>Add-Ins for Office</a:t>
             </a:r>
             <a:endParaRPr lang="en-US" sz="3100" b="0" dirty="0"/>
           </a:p>
@@ -37050,11 +37002,15 @@
           <a:p>
             <a:r>
               <a:rPr lang="en-US" sz="3100" b="0" dirty="0" smtClean="0"/>
-              <a:t>Module 4 – Hook into Office </a:t>
+              <a:t>Module 4 – </a:t>
             </a:r>
             <a:r>
               <a:rPr lang="en-US" sz="3100" b="0" dirty="0" smtClean="0"/>
-              <a:t>365 APIs</a:t>
+              <a:t>Building apps with the 365 </a:t>
+            </a:r>
+            <a:r>
+              <a:rPr lang="en-US" sz="3100" b="0" dirty="0" smtClean="0"/>
+              <a:t>APIs</a:t>
             </a:r>
             <a:endParaRPr lang="en-US" sz="3100" b="0" dirty="0"/>
           </a:p>
@@ -37171,16 +37127,7 @@
           <a:p>
             <a:r>
               <a:rPr lang="en-US" dirty="0" smtClean="0"/>
-              <a:t>Speaker</a:t>
-            </a:r>
-          </a:p>
-          <a:p>
-            <a:endParaRPr lang="en-US" dirty="0" smtClean="0"/>
-          </a:p>
-          <a:p>
-            <a:r>
-              <a:rPr lang="en-US" dirty="0" smtClean="0"/>
-              <a:t>Speaker</a:t>
+              <a:t>Christine Matheney</a:t>
             </a:r>
             <a:endParaRPr lang="en-US" dirty="0"/>
           </a:p>
@@ -37243,7 +37190,11 @@
           <a:p>
             <a:r>
               <a:rPr lang="en-US" sz="3100" b="0" dirty="0" smtClean="0"/>
-              <a:t>Module 5 – Hook into Apps for Office</a:t>
+              <a:t>Module 5 – </a:t>
+            </a:r>
+            <a:r>
+              <a:rPr lang="en-US" sz="3100" b="0" dirty="0" smtClean="0"/>
+              <a:t>Building SharePoint add-ins Using Search</a:t>
             </a:r>
             <a:endParaRPr lang="en-US" sz="3100" b="0" dirty="0"/>
           </a:p>
@@ -37348,12 +37299,8 @@
           </a:p>
           <a:p>
             <a:r>
-              <a:rPr lang="en-US" dirty="0"/>
-              <a:t>Demo of all Samples in this </a:t>
-            </a:r>
-            <a:r>
-              <a:rPr lang="en-US" dirty="0" err="1"/>
-              <a:t>DevCamp</a:t>
+              <a:rPr lang="en-US" dirty="0" smtClean="0"/>
+              <a:t>Demos</a:t>
             </a:r>
             <a:endParaRPr lang="en-US" dirty="0"/>
           </a:p>
@@ -37692,11 +37639,11 @@
           <a:p>
             <a:r>
               <a:rPr lang="en-US" dirty="0" smtClean="0"/>
-              <a:t>Demo of all Samples in this </a:t>
+              <a:t>Demo of </a:t>
             </a:r>
             <a:r>
-              <a:rPr lang="en-US" dirty="0" err="1" smtClean="0"/>
-              <a:t>DevCamp</a:t>
+              <a:rPr lang="en-US" dirty="0" smtClean="0"/>
+              <a:t>what we’ll be building</a:t>
             </a:r>
             <a:endParaRPr lang="en-US" dirty="0" smtClean="0"/>
           </a:p>
@@ -38152,7 +38099,6 @@
               <a:rPr lang="en-US" dirty="0" smtClean="0"/>
               <a:t>Understand Office 365 APIs</a:t>
             </a:r>
-            <a:endParaRPr lang="en-US" dirty="0" smtClean="0"/>
           </a:p>
           <a:p>
             <a:endParaRPr lang="en-US" dirty="0"/>
@@ -38160,11 +38106,7 @@
           <a:p>
             <a:r>
               <a:rPr lang="en-US" dirty="0" smtClean="0"/>
-              <a:t>Understand how to create </a:t>
-            </a:r>
-            <a:r>
-              <a:rPr lang="en-US" dirty="0" smtClean="0"/>
-              <a:t>an ASP.NET MVC5 application that uses the Office 365 APIs</a:t>
+              <a:t>Understand how to create an ASP.NET MVC5 application that uses the Office 365 APIs</a:t>
             </a:r>
             <a:endParaRPr lang="en-US" dirty="0"/>
           </a:p>
@@ -39435,9 +39377,12 @@
 </file>
 
 <file path=customXml/item1.xml><?xml version="1.0" encoding="utf-8"?>
-<p:properties xmlns:p="http://schemas.microsoft.com/office/2006/metadata/properties" xmlns:xsi="http://www.w3.org/2001/XMLSchema-instance" xmlns:pc="http://schemas.microsoft.com/office/infopath/2007/PartnerControls">
-  <documentManagement/>
-</p:properties>
+<?mso-contentType ?>
+<FormTemplates xmlns="http://schemas.microsoft.com/sharepoint/v3/contenttype/forms">
+  <Display>DocumentLibraryForm</Display>
+  <Edit>DocumentLibraryForm</Edit>
+  <New>DocumentLibraryForm</New>
+</FormTemplates>
 </file>
 
 <file path=customXml/item2.xml><?xml version="1.0" encoding="utf-8"?>
@@ -39581,26 +39526,15 @@
 </file>
 
 <file path=customXml/item3.xml><?xml version="1.0" encoding="utf-8"?>
-<?mso-contentType ?>
-<FormTemplates xmlns="http://schemas.microsoft.com/sharepoint/v3/contenttype/forms">
-  <Display>DocumentLibraryForm</Display>
-  <Edit>DocumentLibraryForm</Edit>
-  <New>DocumentLibraryForm</New>
-</FormTemplates>
+<p:properties xmlns:p="http://schemas.microsoft.com/office/2006/metadata/properties" xmlns:xsi="http://www.w3.org/2001/XMLSchema-instance" xmlns:pc="http://schemas.microsoft.com/office/infopath/2007/PartnerControls">
+  <documentManagement/>
+</p:properties>
 </file>
 
 <file path=customXml/itemProps1.xml><?xml version="1.0" encoding="utf-8"?>
-<ds:datastoreItem xmlns:ds="http://schemas.openxmlformats.org/officeDocument/2006/customXml" ds:itemID="{DA593625-DB14-4FB0-B5A9-3269FA9C120B}">
+<ds:datastoreItem xmlns:ds="http://schemas.openxmlformats.org/officeDocument/2006/customXml" ds:itemID="{E1E0CE18-CA03-4891-9CD8-3448778E3D53}">
   <ds:schemaRefs>
-    <ds:schemaRef ds:uri="http://purl.org/dc/elements/1.1/"/>
-    <ds:schemaRef ds:uri="http://schemas.microsoft.com/office/infopath/2007/PartnerControls"/>
-    <ds:schemaRef ds:uri="5fad15d0-477e-40da-a20d-40d4ca777cbd"/>
-    <ds:schemaRef ds:uri="http://purl.org/dc/terms/"/>
-    <ds:schemaRef ds:uri="http://schemas.microsoft.com/office/2006/metadata/properties"/>
-    <ds:schemaRef ds:uri="http://schemas.microsoft.com/office/2006/documentManagement/types"/>
-    <ds:schemaRef ds:uri="http://schemas.openxmlformats.org/package/2006/metadata/core-properties"/>
-    <ds:schemaRef ds:uri="http://purl.org/dc/dcmitype/"/>
-    <ds:schemaRef ds:uri="http://www.w3.org/XML/1998/namespace"/>
+    <ds:schemaRef ds:uri="http://schemas.microsoft.com/sharepoint/v3/contenttype/forms"/>
   </ds:schemaRefs>
 </ds:datastoreItem>
 </file>
@@ -39624,9 +39558,17 @@
 </file>
 
 <file path=customXml/itemProps3.xml><?xml version="1.0" encoding="utf-8"?>
-<ds:datastoreItem xmlns:ds="http://schemas.openxmlformats.org/officeDocument/2006/customXml" ds:itemID="{E1E0CE18-CA03-4891-9CD8-3448778E3D53}">
+<ds:datastoreItem xmlns:ds="http://schemas.openxmlformats.org/officeDocument/2006/customXml" ds:itemID="{DA593625-DB14-4FB0-B5A9-3269FA9C120B}">
   <ds:schemaRefs>
-    <ds:schemaRef ds:uri="http://schemas.microsoft.com/sharepoint/v3/contenttype/forms"/>
+    <ds:schemaRef ds:uri="http://purl.org/dc/elements/1.1/"/>
+    <ds:schemaRef ds:uri="http://schemas.microsoft.com/office/infopath/2007/PartnerControls"/>
+    <ds:schemaRef ds:uri="5fad15d0-477e-40da-a20d-40d4ca777cbd"/>
+    <ds:schemaRef ds:uri="http://purl.org/dc/terms/"/>
+    <ds:schemaRef ds:uri="http://schemas.microsoft.com/office/2006/metadata/properties"/>
+    <ds:schemaRef ds:uri="http://schemas.microsoft.com/office/2006/documentManagement/types"/>
+    <ds:schemaRef ds:uri="http://schemas.openxmlformats.org/package/2006/metadata/core-properties"/>
+    <ds:schemaRef ds:uri="http://purl.org/dc/dcmitype/"/>
+    <ds:schemaRef ds:uri="http://www.w3.org/XML/1998/namespace"/>
   </ds:schemaRefs>
 </ds:datastoreItem>
 </file>
</xml_diff>